<commit_message>
Add README.md with project structure, setup instructions, and demo details
</commit_message>
<xml_diff>
--- a/20259257001 Çağatay ÜRESİN - Yazılım Güveliği ve Analizi - SonarQube.pptx
+++ b/20259257001 Çağatay ÜRESİN - Yazılım Güveliği ve Analizi - SonarQube.pptx
@@ -34,28 +34,29 @@
     <p:sldId id="279" r:id="rId29"/>
     <p:sldId id="280" r:id="rId30"/>
     <p:sldId id="281" r:id="rId31"/>
+    <p:sldId id="282" r:id="rId32"/>
   </p:sldIdLst>
   <p:sldSz cy="5143500" cx="9144000"/>
   <p:notesSz cx="6858000" cy="9144000"/>
   <p:embeddedFontLst>
     <p:embeddedFont>
       <p:font typeface="Source Code Pro"/>
-      <p:regular r:id="rId32"/>
-      <p:bold r:id="rId33"/>
-      <p:italic r:id="rId34"/>
-      <p:boldItalic r:id="rId35"/>
+      <p:regular r:id="rId33"/>
+      <p:bold r:id="rId34"/>
+      <p:italic r:id="rId35"/>
+      <p:boldItalic r:id="rId36"/>
     </p:embeddedFont>
     <p:embeddedFont>
       <p:font typeface="Oswald"/>
-      <p:regular r:id="rId36"/>
-      <p:bold r:id="rId37"/>
+      <p:regular r:id="rId37"/>
+      <p:bold r:id="rId38"/>
     </p:embeddedFont>
     <p:embeddedFont>
       <p:font typeface="Roboto Mono"/>
-      <p:regular r:id="rId38"/>
-      <p:bold r:id="rId39"/>
-      <p:italic r:id="rId40"/>
-      <p:boldItalic r:id="rId41"/>
+      <p:regular r:id="rId39"/>
+      <p:bold r:id="rId40"/>
+      <p:italic r:id="rId41"/>
+      <p:boldItalic r:id="rId42"/>
     </p:embeddedFont>
   </p:embeddedFontLst>
   <p:defaultTextStyle>
@@ -3174,7 +3175,7 @@
   <p:cSld>
     <p:spTree>
       <p:nvGrpSpPr>
-        <p:cNvPr id="226" name="Shape 226"/>
+        <p:cNvPr id="227" name="Shape 227"/>
         <p:cNvGrpSpPr/>
         <p:nvPr/>
       </p:nvGrpSpPr>
@@ -3188,7 +3189,7 @@
       </p:grpSpPr>
       <p:sp>
         <p:nvSpPr>
-          <p:cNvPr id="227" name="Google Shape;227;g3aa33d2eec7_0_114:notes"/>
+          <p:cNvPr id="228" name="Google Shape;228;g3aa33d2eec7_0_114:notes"/>
           <p:cNvSpPr/>
           <p:nvPr>
             <p:ph idx="2" type="sldImg"/>
@@ -3223,7 +3224,7 @@
       </p:sp>
       <p:sp>
         <p:nvSpPr>
-          <p:cNvPr id="228" name="Google Shape;228;g3aa33d2eec7_0_114:notes"/>
+          <p:cNvPr id="229" name="Google Shape;229;g3aa33d2eec7_0_114:notes"/>
           <p:cNvSpPr txBox="1"/>
           <p:nvPr>
             <p:ph idx="1" type="body"/>
@@ -3550,7 +3551,7 @@
   <p:cSld>
     <p:spTree>
       <p:nvGrpSpPr>
-        <p:cNvPr id="233" name="Shape 233"/>
+        <p:cNvPr id="234" name="Shape 234"/>
         <p:cNvGrpSpPr/>
         <p:nvPr/>
       </p:nvGrpSpPr>
@@ -3564,7 +3565,7 @@
       </p:grpSpPr>
       <p:sp>
         <p:nvSpPr>
-          <p:cNvPr id="234" name="Google Shape;234;g3aa33d2eec7_0_124:notes"/>
+          <p:cNvPr id="235" name="Google Shape;235;g3aa33d2eec7_0_124:notes"/>
           <p:cNvSpPr/>
           <p:nvPr>
             <p:ph idx="2" type="sldImg"/>
@@ -3599,7 +3600,7 @@
       </p:sp>
       <p:sp>
         <p:nvSpPr>
-          <p:cNvPr id="235" name="Google Shape;235;g3aa33d2eec7_0_124:notes"/>
+          <p:cNvPr id="236" name="Google Shape;236;g3aa33d2eec7_0_124:notes"/>
           <p:cNvSpPr txBox="1"/>
           <p:nvPr>
             <p:ph idx="1" type="body"/>
@@ -3649,7 +3650,7 @@
   <p:cSld>
     <p:spTree>
       <p:nvGrpSpPr>
-        <p:cNvPr id="240" name="Shape 240"/>
+        <p:cNvPr id="241" name="Shape 241"/>
         <p:cNvGrpSpPr/>
         <p:nvPr/>
       </p:nvGrpSpPr>
@@ -3663,7 +3664,7 @@
       </p:grpSpPr>
       <p:sp>
         <p:nvSpPr>
-          <p:cNvPr id="241" name="Google Shape;241;g3aa33d2eec7_0_130:notes"/>
+          <p:cNvPr id="242" name="Google Shape;242;g3aa33d2eec7_0_130:notes"/>
           <p:cNvSpPr/>
           <p:nvPr>
             <p:ph idx="2" type="sldImg"/>
@@ -3698,7 +3699,7 @@
       </p:sp>
       <p:sp>
         <p:nvSpPr>
-          <p:cNvPr id="242" name="Google Shape;242;g3aa33d2eec7_0_130:notes"/>
+          <p:cNvPr id="243" name="Google Shape;243;g3aa33d2eec7_0_130:notes"/>
           <p:cNvSpPr txBox="1"/>
           <p:nvPr>
             <p:ph idx="1" type="body"/>
@@ -3748,7 +3749,7 @@
   <p:cSld>
     <p:spTree>
       <p:nvGrpSpPr>
-        <p:cNvPr id="247" name="Shape 247"/>
+        <p:cNvPr id="248" name="Shape 248"/>
         <p:cNvGrpSpPr/>
         <p:nvPr/>
       </p:nvGrpSpPr>
@@ -3762,7 +3763,7 @@
       </p:grpSpPr>
       <p:sp>
         <p:nvSpPr>
-          <p:cNvPr id="248" name="Google Shape;248;g3aa33d2eec7_0_143:notes"/>
+          <p:cNvPr id="249" name="Google Shape;249;g3aa33d2eec7_0_143:notes"/>
           <p:cNvSpPr/>
           <p:nvPr>
             <p:ph idx="2" type="sldImg"/>
@@ -3797,7 +3798,106 @@
       </p:sp>
       <p:sp>
         <p:nvSpPr>
-          <p:cNvPr id="249" name="Google Shape;249;g3aa33d2eec7_0_143:notes"/>
+          <p:cNvPr id="250" name="Google Shape;250;g3aa33d2eec7_0_143:notes"/>
+          <p:cNvSpPr txBox="1"/>
+          <p:nvPr>
+            <p:ph idx="1" type="body"/>
+          </p:nvPr>
+        </p:nvSpPr>
+        <p:spPr>
+          <a:xfrm>
+            <a:off x="685800" y="4343400"/>
+            <a:ext cx="5486400" cy="4114800"/>
+          </a:xfrm>
+          <a:prstGeom prst="rect">
+            <a:avLst/>
+          </a:prstGeom>
+        </p:spPr>
+        <p:txBody>
+          <a:bodyPr anchorCtr="0" anchor="t" bIns="91425" lIns="91425" spcFirstLastPara="1" rIns="91425" wrap="square" tIns="91425">
+            <a:noAutofit/>
+          </a:bodyPr>
+          <a:lstStyle/>
+          <a:p>
+            <a:pPr indent="0" lvl="0" marL="0" rtl="0" algn="l">
+              <a:spcBef>
+                <a:spcPts val="0"/>
+              </a:spcBef>
+              <a:spcAft>
+                <a:spcPts val="0"/>
+              </a:spcAft>
+              <a:buNone/>
+            </a:pPr>
+            <a:r>
+              <a:t/>
+            </a:r>
+            <a:endParaRPr/>
+          </a:p>
+        </p:txBody>
+      </p:sp>
+    </p:spTree>
+  </p:cSld>
+  <p:clrMapOvr>
+    <a:masterClrMapping/>
+  </p:clrMapOvr>
+</p:notes>
+</file>
+
+<file path=ppt/notesSlides/notesSlide27.xml><?xml version="1.0" encoding="utf-8"?>
+<p:notes xmlns:a="http://schemas.openxmlformats.org/drawingml/2006/main" xmlns:r="http://schemas.openxmlformats.org/officeDocument/2006/relationships" xmlns:mc="http://schemas.openxmlformats.org/markup-compatibility/2006" xmlns:mv="urn:schemas-microsoft-com:mac:vml" xmlns:p="http://schemas.openxmlformats.org/presentationml/2006/main" xmlns:c="http://schemas.openxmlformats.org/drawingml/2006/chart" xmlns:dgm="http://schemas.openxmlformats.org/drawingml/2006/diagram" xmlns:o="urn:schemas-microsoft-com:office:office" xmlns:v="urn:schemas-microsoft-com:vml" xmlns:pvml="urn:schemas-microsoft-com:office:powerpoint" xmlns:com="http://schemas.openxmlformats.org/drawingml/2006/compatibility" xmlns:p14="http://schemas.microsoft.com/office/powerpoint/2010/main" xmlns:p15="http://schemas.microsoft.com/office/powerpoint/2012/main" xmlns:ahyp="http://schemas.microsoft.com/office/drawing/2018/hyperlinkcolor" showMasterPhAnim="0" showMasterSp="0">
+  <p:cSld>
+    <p:spTree>
+      <p:nvGrpSpPr>
+        <p:cNvPr id="254" name="Shape 254"/>
+        <p:cNvGrpSpPr/>
+        <p:nvPr/>
+      </p:nvGrpSpPr>
+      <p:grpSpPr>
+        <a:xfrm>
+          <a:off x="0" y="0"/>
+          <a:ext cx="0" cy="0"/>
+          <a:chOff x="0" y="0"/>
+          <a:chExt cx="0" cy="0"/>
+        </a:xfrm>
+      </p:grpSpPr>
+      <p:sp>
+        <p:nvSpPr>
+          <p:cNvPr id="255" name="Google Shape;255;g3aa33d2eec7_0_198:notes"/>
+          <p:cNvSpPr/>
+          <p:nvPr>
+            <p:ph idx="2" type="sldImg"/>
+          </p:nvPr>
+        </p:nvSpPr>
+        <p:spPr>
+          <a:xfrm>
+            <a:off x="381300" y="685800"/>
+            <a:ext cx="6096000" cy="3429000"/>
+          </a:xfrm>
+          <a:custGeom>
+            <a:rect b="b" l="l" r="r" t="t"/>
+            <a:pathLst>
+              <a:path extrusionOk="0" h="120000" w="120000">
+                <a:moveTo>
+                  <a:pt x="0" y="0"/>
+                </a:moveTo>
+                <a:lnTo>
+                  <a:pt x="120000" y="0"/>
+                </a:lnTo>
+                <a:lnTo>
+                  <a:pt x="120000" y="120000"/>
+                </a:lnTo>
+                <a:lnTo>
+                  <a:pt x="0" y="120000"/>
+                </a:lnTo>
+                <a:close/>
+              </a:path>
+            </a:pathLst>
+          </a:custGeom>
+        </p:spPr>
+      </p:sp>
+      <p:sp>
+        <p:nvSpPr>
+          <p:cNvPr id="256" name="Google Shape;256;g3aa33d2eec7_0_198:notes"/>
           <p:cNvSpPr txBox="1"/>
           <p:nvPr>
             <p:ph idx="1" type="body"/>
@@ -13715,6 +13815,34 @@
           </a:p>
         </p:txBody>
       </p:sp>
+      <p:pic>
+        <p:nvPicPr>
+          <p:cNvPr id="226" name="Google Shape;226;p34"/>
+          <p:cNvPicPr preferRelativeResize="0"/>
+          <p:nvPr/>
+        </p:nvPicPr>
+        <p:blipFill>
+          <a:blip r:embed="rId3">
+            <a:alphaModFix/>
+          </a:blip>
+          <a:stretch>
+            <a:fillRect/>
+          </a:stretch>
+        </p:blipFill>
+        <p:spPr>
+          <a:xfrm>
+            <a:off x="881050" y="4042363"/>
+            <a:ext cx="7381875" cy="638175"/>
+          </a:xfrm>
+          <a:prstGeom prst="rect">
+            <a:avLst/>
+          </a:prstGeom>
+          <a:noFill/>
+          <a:ln>
+            <a:noFill/>
+          </a:ln>
+        </p:spPr>
+      </p:pic>
     </p:spTree>
   </p:cSld>
   <p:clrMapOvr>
@@ -13728,7 +13856,7 @@
   <p:cSld>
     <p:spTree>
       <p:nvGrpSpPr>
-        <p:cNvPr id="229" name="Shape 229"/>
+        <p:cNvPr id="230" name="Shape 230"/>
         <p:cNvGrpSpPr/>
         <p:nvPr/>
       </p:nvGrpSpPr>
@@ -13742,7 +13870,7 @@
       </p:grpSpPr>
       <p:sp>
         <p:nvSpPr>
-          <p:cNvPr id="230" name="Google Shape;230;p35"/>
+          <p:cNvPr id="231" name="Google Shape;231;p35"/>
           <p:cNvSpPr txBox="1"/>
           <p:nvPr>
             <p:ph type="title"/>
@@ -13782,7 +13910,7 @@
       </p:sp>
       <p:sp>
         <p:nvSpPr>
-          <p:cNvPr id="231" name="Google Shape;231;p35"/>
+          <p:cNvPr id="232" name="Google Shape;232;p35"/>
           <p:cNvSpPr txBox="1"/>
           <p:nvPr>
             <p:ph idx="1" type="body"/>
@@ -13908,7 +14036,7 @@
       </p:sp>
       <p:sp>
         <p:nvSpPr>
-          <p:cNvPr id="232" name="Google Shape;232;p35"/>
+          <p:cNvPr id="233" name="Google Shape;233;p35"/>
           <p:cNvSpPr txBox="1"/>
           <p:nvPr>
             <p:ph idx="12" type="sldNum"/>
@@ -13959,7 +14087,7 @@
   <p:cSld>
     <p:spTree>
       <p:nvGrpSpPr>
-        <p:cNvPr id="236" name="Shape 236"/>
+        <p:cNvPr id="237" name="Shape 237"/>
         <p:cNvGrpSpPr/>
         <p:nvPr/>
       </p:nvGrpSpPr>
@@ -13973,7 +14101,7 @@
       </p:grpSpPr>
       <p:sp>
         <p:nvSpPr>
-          <p:cNvPr id="237" name="Google Shape;237;p36"/>
+          <p:cNvPr id="238" name="Google Shape;238;p36"/>
           <p:cNvSpPr txBox="1"/>
           <p:nvPr>
             <p:ph type="title"/>
@@ -14013,7 +14141,7 @@
       </p:sp>
       <p:sp>
         <p:nvSpPr>
-          <p:cNvPr id="238" name="Google Shape;238;p36"/>
+          <p:cNvPr id="239" name="Google Shape;239;p36"/>
           <p:cNvSpPr txBox="1"/>
           <p:nvPr>
             <p:ph idx="1" type="body"/>
@@ -14139,7 +14267,7 @@
       </p:sp>
       <p:sp>
         <p:nvSpPr>
-          <p:cNvPr id="239" name="Google Shape;239;p36"/>
+          <p:cNvPr id="240" name="Google Shape;240;p36"/>
           <p:cNvSpPr txBox="1"/>
           <p:nvPr>
             <p:ph idx="12" type="sldNum"/>
@@ -14190,7 +14318,7 @@
   <p:cSld>
     <p:spTree>
       <p:nvGrpSpPr>
-        <p:cNvPr id="243" name="Shape 243"/>
+        <p:cNvPr id="244" name="Shape 244"/>
         <p:cNvGrpSpPr/>
         <p:nvPr/>
       </p:nvGrpSpPr>
@@ -14204,7 +14332,7 @@
       </p:grpSpPr>
       <p:sp>
         <p:nvSpPr>
-          <p:cNvPr id="244" name="Google Shape;244;p37"/>
+          <p:cNvPr id="245" name="Google Shape;245;p37"/>
           <p:cNvSpPr txBox="1"/>
           <p:nvPr>
             <p:ph type="title"/>
@@ -14244,7 +14372,7 @@
       </p:sp>
       <p:sp>
         <p:nvSpPr>
-          <p:cNvPr id="245" name="Google Shape;245;p37"/>
+          <p:cNvPr id="246" name="Google Shape;246;p37"/>
           <p:cNvSpPr txBox="1"/>
           <p:nvPr>
             <p:ph idx="1" type="body"/>
@@ -14404,7 +14532,7 @@
       </p:sp>
       <p:sp>
         <p:nvSpPr>
-          <p:cNvPr id="246" name="Google Shape;246;p37"/>
+          <p:cNvPr id="247" name="Google Shape;247;p37"/>
           <p:cNvSpPr txBox="1"/>
           <p:nvPr>
             <p:ph idx="12" type="sldNum"/>
@@ -14455,7 +14583,7 @@
   <p:cSld>
     <p:spTree>
       <p:nvGrpSpPr>
-        <p:cNvPr id="250" name="Shape 250"/>
+        <p:cNvPr id="251" name="Shape 251"/>
         <p:cNvGrpSpPr/>
         <p:nvPr/>
       </p:nvGrpSpPr>
@@ -14469,7 +14597,7 @@
       </p:grpSpPr>
       <p:sp>
         <p:nvSpPr>
-          <p:cNvPr id="251" name="Google Shape;251;p38"/>
+          <p:cNvPr id="252" name="Google Shape;252;p38"/>
           <p:cNvSpPr txBox="1"/>
           <p:nvPr>
             <p:ph type="title"/>
@@ -14509,7 +14637,112 @@
       </p:sp>
       <p:sp>
         <p:nvSpPr>
-          <p:cNvPr id="252" name="Google Shape;252;p38"/>
+          <p:cNvPr id="253" name="Google Shape;253;p38"/>
+          <p:cNvSpPr txBox="1"/>
+          <p:nvPr>
+            <p:ph idx="12" type="sldNum"/>
+          </p:nvPr>
+        </p:nvSpPr>
+        <p:spPr>
+          <a:xfrm>
+            <a:off x="8585813" y="4854504"/>
+            <a:ext cx="548700" cy="393600"/>
+          </a:xfrm>
+          <a:prstGeom prst="rect">
+            <a:avLst/>
+          </a:prstGeom>
+        </p:spPr>
+        <p:txBody>
+          <a:bodyPr anchorCtr="0" anchor="ctr" bIns="91425" lIns="91425" spcFirstLastPara="1" rIns="91425" wrap="square" tIns="91425">
+            <a:normAutofit/>
+          </a:bodyPr>
+          <a:lstStyle/>
+          <a:p>
+            <a:pPr indent="0" lvl="0" marL="0" rtl="0" algn="r">
+              <a:spcBef>
+                <a:spcPts val="0"/>
+              </a:spcBef>
+              <a:spcAft>
+                <a:spcPts val="0"/>
+              </a:spcAft>
+              <a:buNone/>
+            </a:pPr>
+            <a:fld id="{00000000-1234-1234-1234-123412341234}" type="slidenum">
+              <a:rPr lang="tr"/>
+              <a:t>‹#›</a:t>
+            </a:fld>
+            <a:endParaRPr/>
+          </a:p>
+        </p:txBody>
+      </p:sp>
+    </p:spTree>
+  </p:cSld>
+  <p:clrMapOvr>
+    <a:masterClrMapping/>
+  </p:clrMapOvr>
+</p:sld>
+</file>
+
+<file path=ppt/slides/slide27.xml><?xml version="1.0" encoding="utf-8"?>
+<p:sld xmlns:a="http://schemas.openxmlformats.org/drawingml/2006/main" xmlns:r="http://schemas.openxmlformats.org/officeDocument/2006/relationships" xmlns:mc="http://schemas.openxmlformats.org/markup-compatibility/2006" xmlns:mv="urn:schemas-microsoft-com:mac:vml" xmlns:p="http://schemas.openxmlformats.org/presentationml/2006/main" xmlns:c="http://schemas.openxmlformats.org/drawingml/2006/chart" xmlns:dgm="http://schemas.openxmlformats.org/drawingml/2006/diagram" xmlns:o="urn:schemas-microsoft-com:office:office" xmlns:v="urn:schemas-microsoft-com:vml" xmlns:pvml="urn:schemas-microsoft-com:office:powerpoint" xmlns:com="http://schemas.openxmlformats.org/drawingml/2006/compatibility" xmlns:p14="http://schemas.microsoft.com/office/powerpoint/2010/main" xmlns:p15="http://schemas.microsoft.com/office/powerpoint/2012/main" xmlns:ahyp="http://schemas.microsoft.com/office/drawing/2018/hyperlinkcolor">
+  <p:cSld>
+    <p:spTree>
+      <p:nvGrpSpPr>
+        <p:cNvPr id="257" name="Shape 257"/>
+        <p:cNvGrpSpPr/>
+        <p:nvPr/>
+      </p:nvGrpSpPr>
+      <p:grpSpPr>
+        <a:xfrm>
+          <a:off x="0" y="0"/>
+          <a:ext cx="0" cy="0"/>
+          <a:chOff x="0" y="0"/>
+          <a:chExt cx="0" cy="0"/>
+        </a:xfrm>
+      </p:grpSpPr>
+      <p:sp>
+        <p:nvSpPr>
+          <p:cNvPr id="258" name="Google Shape;258;p39"/>
+          <p:cNvSpPr txBox="1"/>
+          <p:nvPr>
+            <p:ph type="title"/>
+          </p:nvPr>
+        </p:nvSpPr>
+        <p:spPr>
+          <a:xfrm>
+            <a:off x="430800" y="1889700"/>
+            <a:ext cx="8282400" cy="1516500"/>
+          </a:xfrm>
+          <a:prstGeom prst="rect">
+            <a:avLst/>
+          </a:prstGeom>
+        </p:spPr>
+        <p:txBody>
+          <a:bodyPr anchorCtr="0" anchor="ctr" bIns="91425" lIns="91425" spcFirstLastPara="1" rIns="91425" wrap="square" tIns="91425">
+            <a:normAutofit/>
+          </a:bodyPr>
+          <a:lstStyle/>
+          <a:p>
+            <a:pPr indent="0" lvl="0" marL="0" rtl="0" algn="ctr">
+              <a:spcBef>
+                <a:spcPts val="0"/>
+              </a:spcBef>
+              <a:spcAft>
+                <a:spcPts val="0"/>
+              </a:spcAft>
+              <a:buNone/>
+            </a:pPr>
+            <a:r>
+              <a:rPr lang="tr"/>
+              <a:t>SON</a:t>
+            </a:r>
+            <a:endParaRPr/>
+          </a:p>
+        </p:txBody>
+      </p:sp>
+      <p:sp>
+        <p:nvSpPr>
+          <p:cNvPr id="259" name="Google Shape;259;p39"/>
           <p:cNvSpPr txBox="1"/>
           <p:nvPr>
             <p:ph idx="12" type="sldNum"/>

</xml_diff>